<commit_message>
Made minor change to PPT & exported PDF
</commit_message>
<xml_diff>
--- a/CustomerQueue.pptx
+++ b/CustomerQueue.pptx
@@ -6627,11 +6627,19 @@
           <a:p>
             <a:r>
               <a:rPr lang="en-US" b="1" dirty="0"/>
-              <a:t>Customer: </a:t>
+              <a:t>Customer</a:t>
+            </a:r>
+            <a:r>
+              <a:rPr lang="en-US" b="1"/>
+              <a:t>: </a:t>
+            </a:r>
+            <a:r>
+              <a:rPr lang="en-US"/>
+              <a:t>Customers, </a:t>
             </a:r>
             <a:r>
               <a:rPr lang="en-US" dirty="0"/>
-              <a:t>Customers $ Employees &amp; customers of different industries</a:t>
+              <a:t>Employees &amp; customers of different industries</a:t>
             </a:r>
           </a:p>
           <a:p>

</xml_diff>

<commit_message>
Made more corrections to PPT file & exported to PDF
</commit_message>
<xml_diff>
--- a/CustomerQueue.pptx
+++ b/CustomerQueue.pptx
@@ -6288,7 +6288,7 @@
           <a:lstStyle/>
           <a:p>
             <a:r>
-              <a:rPr lang="en-US" dirty="0"/>
+              <a:rPr lang="en-US" b="1" dirty="0"/>
               <a:t>Known Issues</a:t>
             </a:r>
           </a:p>
@@ -6627,19 +6627,11 @@
           <a:p>
             <a:r>
               <a:rPr lang="en-US" b="1" dirty="0"/>
-              <a:t>Customer</a:t>
-            </a:r>
-            <a:r>
-              <a:rPr lang="en-US" b="1"/>
-              <a:t>: </a:t>
-            </a:r>
-            <a:r>
-              <a:rPr lang="en-US"/>
-              <a:t>Customers, </a:t>
+              <a:t>Customer: </a:t>
             </a:r>
             <a:r>
               <a:rPr lang="en-US" dirty="0"/>
-              <a:t>Employees &amp; customers of different industries</a:t>
+              <a:t>Customers, Employees &amp; Customers of different industries</a:t>
             </a:r>
           </a:p>
           <a:p>
@@ -6774,7 +6766,7 @@
           <a:lstStyle/>
           <a:p>
             <a:r>
-              <a:rPr lang="en-US" dirty="0"/>
+              <a:rPr lang="en-US" b="1" dirty="0"/>
               <a:t>System Requirements</a:t>
             </a:r>
           </a:p>
@@ -6944,7 +6936,7 @@
           <a:lstStyle/>
           <a:p>
             <a:r>
-              <a:rPr lang="en-US" dirty="0"/>
+              <a:rPr lang="en-US" b="1" dirty="0"/>
               <a:t>Schedule</a:t>
             </a:r>
           </a:p>
@@ -6960,7 +6952,7 @@
             <p:ph idx="1"/>
             <p:extLst>
               <p:ext uri="{D42A27DB-BD31-4B8C-83A1-F6EECF244321}">
-                <p14:modId xmlns:p14="http://schemas.microsoft.com/office/powerpoint/2010/main" val="2656545528"/>
+                <p14:modId xmlns:p14="http://schemas.microsoft.com/office/powerpoint/2010/main" val="674160769"/>
               </p:ext>
             </p:extLst>
           </p:nvPr>
@@ -7533,7 +7525,7 @@
                       <a:pPr algn="ctr"/>
                       <a:r>
                         <a:rPr lang="en-US" dirty="0"/>
-                        <a:t>2</a:t>
+                        <a:t>1</a:t>
                       </a:r>
                     </a:p>
                   </a:txBody>
@@ -7662,7 +7654,7 @@
                       <a:pPr algn="ctr"/>
                       <a:r>
                         <a:rPr lang="en-US" dirty="0"/>
-                        <a:t>2</a:t>
+                        <a:t>1</a:t>
                       </a:r>
                     </a:p>
                   </a:txBody>
@@ -7791,7 +7783,7 @@
                       <a:pPr algn="ctr"/>
                       <a:r>
                         <a:rPr lang="en-US" dirty="0"/>
-                        <a:t>2</a:t>
+                        <a:t>1</a:t>
                       </a:r>
                     </a:p>
                   </a:txBody>
@@ -7920,7 +7912,7 @@
                       <a:pPr algn="ctr"/>
                       <a:r>
                         <a:rPr lang="en-US" dirty="0"/>
-                        <a:t>2</a:t>
+                        <a:t>1</a:t>
                       </a:r>
                     </a:p>
                   </a:txBody>
@@ -8076,7 +8068,7 @@
           <a:lstStyle/>
           <a:p>
             <a:r>
-              <a:rPr lang="en-US" dirty="0"/>
+              <a:rPr lang="en-US" b="1" dirty="0"/>
               <a:t>Schedule (cont.)</a:t>
             </a:r>
           </a:p>
@@ -8358,7 +8350,7 @@
           <a:lstStyle/>
           <a:p>
             <a:r>
-              <a:rPr lang="en-US" dirty="0"/>
+              <a:rPr lang="en-US" b="1" dirty="0"/>
               <a:t>Challenges Faced</a:t>
             </a:r>
           </a:p>

</xml_diff>

<commit_message>
Added 'queued' logo to PPT & PDF
</commit_message>
<xml_diff>
--- a/CustomerQueue.pptx
+++ b/CustomerQueue.pptx
@@ -6214,28 +6214,27 @@
       </p:sp>
       <p:pic>
         <p:nvPicPr>
-          <p:cNvPr id="4" name="Picture 3"/>
+          <p:cNvPr id="5" name="Picture 4"/>
           <p:cNvPicPr>
             <a:picLocks noChangeAspect="1"/>
           </p:cNvPicPr>
           <p:nvPr/>
         </p:nvPicPr>
-        <p:blipFill>
-          <a:blip r:embed="rId2" cstate="print">
+        <p:blipFill rotWithShape="1">
+          <a:blip r:embed="rId2">
             <a:extLst>
               <a:ext uri="{28A0092B-C50C-407E-A947-70E740481C1C}">
                 <a14:useLocalDpi xmlns:a14="http://schemas.microsoft.com/office/drawing/2010/main" val="0"/>
               </a:ext>
             </a:extLst>
           </a:blip>
-          <a:stretch>
-            <a:fillRect/>
-          </a:stretch>
+          <a:srcRect l="10245" t="25762" r="8261" b="37992"/>
+          <a:stretch/>
         </p:blipFill>
         <p:spPr>
           <a:xfrm>
-            <a:off x="2857243" y="1049137"/>
-            <a:ext cx="5421081" cy="1552913"/>
+            <a:off x="2242158" y="1507341"/>
+            <a:ext cx="5348614" cy="1294272"/>
           </a:xfrm>
           <a:prstGeom prst="rect">
             <a:avLst/>

</xml_diff>

<commit_message>
Made minor edits to PPT & PDF
</commit_message>
<xml_diff>
--- a/CustomerQueue.pptx
+++ b/CustomerQueue.pptx
@@ -6787,13 +6787,13 @@
           <a:lstStyle/>
           <a:p>
             <a:r>
-              <a:rPr lang="en-US" sz="2400" dirty="0"/>
+              <a:rPr lang="en-US" sz="2400" b="1" dirty="0"/>
               <a:t>Make sure ALL REQUIRED credentials are entered</a:t>
             </a:r>
           </a:p>
           <a:p>
             <a:r>
-              <a:rPr lang="en-US" sz="2400" dirty="0"/>
+              <a:rPr lang="en-US" sz="2400" b="1" dirty="0"/>
               <a:t>When customer is removed from queue, everyone after them moves up in the queue (x-1)</a:t>
             </a:r>
           </a:p>

</xml_diff>

<commit_message>
Moved arrow in 'Design & Architecture' slide
</commit_message>
<xml_diff>
--- a/CustomerQueue.pptx
+++ b/CustomerQueue.pptx
@@ -9170,14 +9170,15 @@
         <p:nvCxnSpPr>
           <p:cNvPr id="69" name="Straight Arrow Connector 68"/>
           <p:cNvCxnSpPr>
+            <a:stCxn id="48" idx="3"/>
             <a:endCxn id="52" idx="1"/>
           </p:cNvCxnSpPr>
           <p:nvPr/>
         </p:nvCxnSpPr>
         <p:spPr>
           <a:xfrm flipV="1">
-            <a:off x="5523413" y="2135089"/>
-            <a:ext cx="1944185" cy="10734"/>
+            <a:off x="6015293" y="2135089"/>
+            <a:ext cx="1452305" cy="10734"/>
           </a:xfrm>
           <a:prstGeom prst="straightConnector1">
             <a:avLst/>

</xml_diff>

<commit_message>
Moved 'Gradle Build' bullet point from 'Challenges Faced' slide to 'Known Issues' slide
</commit_message>
<xml_diff>
--- a/CustomerQueue.pptx
+++ b/CustomerQueue.pptx
@@ -6328,16 +6328,6 @@
               <a:t> code did not initialize when inside the same method with Spring Framework Initialization</a:t>
             </a:r>
           </a:p>
-          <a:p>
-            <a:r>
-              <a:rPr lang="en-US" b="1" dirty="0" err="1"/>
-              <a:t>Gradle</a:t>
-            </a:r>
-            <a:r>
-              <a:rPr lang="en-US" b="1" dirty="0"/>
-              <a:t> build longer than needed</a:t>
-            </a:r>
-          </a:p>
         </p:txBody>
       </p:sp>
       <p:pic>
@@ -6362,7 +6352,7 @@
         </p:blipFill>
         <p:spPr>
           <a:xfrm>
-            <a:off x="2530256" y="4044115"/>
+            <a:off x="2555308" y="3455392"/>
             <a:ext cx="4807907" cy="2403954"/>
           </a:xfrm>
           <a:prstGeom prst="rect">
@@ -6438,9 +6428,22 @@
           <a:lstStyle/>
           <a:p>
             <a:r>
-              <a:rPr lang="en-US" dirty="0"/>
+              <a:rPr lang="en-US" b="1" dirty="0"/>
               <a:t>Program will only work if establishment has Internet connection</a:t>
             </a:r>
+          </a:p>
+          <a:p>
+            <a:r>
+              <a:rPr lang="en-US" b="1" dirty="0" err="1"/>
+              <a:t>Gradle</a:t>
+            </a:r>
+            <a:r>
+              <a:rPr lang="en-US" b="1" dirty="0"/>
+              <a:t> build longer than needed</a:t>
+            </a:r>
+          </a:p>
+          <a:p>
+            <a:endParaRPr lang="en-US" dirty="0"/>
           </a:p>
         </p:txBody>
       </p:sp>
@@ -6466,8 +6469,8 @@
         </p:blipFill>
         <p:spPr>
           <a:xfrm>
-            <a:off x="3006246" y="2757089"/>
-            <a:ext cx="3752198" cy="2954388"/>
+            <a:off x="3444658" y="3102283"/>
+            <a:ext cx="3313786" cy="2609193"/>
           </a:xfrm>
           <a:prstGeom prst="rect">
             <a:avLst/>

</xml_diff>